<commit_message>
Small updates to IETF105 presentation
Small editorial updates to IETF105 presentation
</commit_message>
<xml_diff>
--- a/PRESENTATIONS/2019-07_IETF105_W3C-WoT-Update.pptx
+++ b/PRESENTATIONS/2019-07_IETF105_W3C-WoT-Update.pptx
@@ -6009,13 +6009,6 @@
   <p:clrMapOvr>
     <a:masterClrMapping/>
   </p:clrMapOvr>
-  <p:timing>
-    <p:tnLst>
-      <p:par>
-        <p:cTn id="1" dur="indefinite" restart="never" nodeType="tmRoot"/>
-      </p:par>
-    </p:tnLst>
-  </p:timing>
 </p:sld>
 </file>
 
@@ -6236,7 +6229,7 @@
           <p:cNvPr id="7" name="Inhaltsplatzhalter 5">
             <a:extLst>
               <a:ext uri="{FF2B5EF4-FFF2-40B4-BE49-F238E27FC236}">
-                <a16:creationId xmlns:a16="http://schemas.microsoft.com/office/drawing/2014/main" xmlns="" id="{CECCD964-B803-436B-ABB9-013564AE8161}"/>
+                <a16:creationId xmlns:a16="http://schemas.microsoft.com/office/drawing/2014/main" id="{CECCD964-B803-436B-ABB9-013564AE8161}"/>
               </a:ext>
             </a:extLst>
           </p:cNvPr>
@@ -6420,13 +6413,6 @@
   <p:clrMapOvr>
     <a:masterClrMapping/>
   </p:clrMapOvr>
-  <p:timing>
-    <p:tnLst>
-      <p:par>
-        <p:cTn id="1" dur="indefinite" restart="never" nodeType="tmRoot"/>
-      </p:par>
-    </p:tnLst>
-  </p:timing>
 </p:sld>
 </file>
 
@@ -6502,10 +6488,6 @@
               <a:rPr lang="en-US" b="1" dirty="0"/>
               <a:t>W3C WoT Interest Group (IG)</a:t>
             </a:r>
-            <a:r>
-              <a:rPr lang="en-US" sz="2400" dirty="0"/>
-              <a:t/>
-            </a:r>
             <a:br>
               <a:rPr lang="en-US" sz="2400" dirty="0"/>
             </a:br>
@@ -6634,10 +6616,6 @@
               <a:rPr lang="en-US" sz="3000" b="1" dirty="0"/>
               <a:t>W3C WoT Working Group (WG)</a:t>
             </a:r>
-            <a:r>
-              <a:rPr lang="en-US" sz="3000" dirty="0"/>
-              <a:t/>
-            </a:r>
             <a:br>
               <a:rPr lang="en-US" sz="3000" dirty="0"/>
             </a:br>
@@ -6685,11 +6663,7 @@
             <a:pPr lvl="1"/>
             <a:r>
               <a:rPr lang="en-US" dirty="0"/>
-              <a:t>Only W3C Members and Invited </a:t>
-            </a:r>
-            <a:r>
-              <a:rPr lang="en-US" dirty="0" smtClean="0"/>
-              <a:t>Experts</a:t>
+              <a:t>Only W3C Members and Invited Experts</a:t>
             </a:r>
           </a:p>
           <a:p>
@@ -6704,27 +6678,14 @@
             <a:pPr lvl="1"/>
             <a:r>
               <a:rPr lang="en-US" b="1" i="1" dirty="0"/>
-              <a:t>Architecture and Thing Description were published as Candidate Recommendations  on 16 May </a:t>
-            </a:r>
-            <a:r>
-              <a:rPr lang="en-US" b="1" i="1" dirty="0" smtClean="0"/>
-              <a:t>2019</a:t>
-            </a:r>
-            <a:endParaRPr lang="en-US" b="1" i="1" dirty="0" smtClean="0"/>
+              <a:t>Architecture and Thing Description were published as Candidate Recommendations  on 16 May 2019</a:t>
+            </a:r>
           </a:p>
           <a:p>
             <a:pPr lvl="1"/>
             <a:r>
-              <a:rPr lang="en-US" b="1" i="1" dirty="0" smtClean="0"/>
-              <a:t>Notes </a:t>
-            </a:r>
-            <a:r>
               <a:rPr lang="en-US" b="1" i="1" dirty="0"/>
-              <a:t>published on Protocol Bindings, Security, and Scripting </a:t>
-            </a:r>
-            <a:r>
-              <a:rPr lang="en-US" b="1" i="1" dirty="0" smtClean="0"/>
-              <a:t>API</a:t>
+              <a:t>Notes published on Protocol Bindings, Security, and Scripting API</a:t>
             </a:r>
             <a:endParaRPr lang="en-US" dirty="0"/>
           </a:p>
@@ -6741,7 +6702,7 @@
           <p:cNvPr id="5" name="Title 1">
             <a:extLst>
               <a:ext uri="{FF2B5EF4-FFF2-40B4-BE49-F238E27FC236}">
-                <a16:creationId xmlns:a16="http://schemas.microsoft.com/office/drawing/2014/main" xmlns="" id="{FCC294CE-B78C-4953-AE9D-7BCAAA1CD8D4}"/>
+                <a16:creationId xmlns:a16="http://schemas.microsoft.com/office/drawing/2014/main" id="{FCC294CE-B78C-4953-AE9D-7BCAAA1CD8D4}"/>
               </a:ext>
             </a:extLst>
           </p:cNvPr>
@@ -10021,7 +9982,7 @@
           <a:lstStyle/>
           <a:p>
             <a:r>
-              <a:rPr lang="de-DE" dirty="0" smtClean="0"/>
+              <a:rPr lang="de-DE" dirty="0"/>
               <a:t>Published Candidate Recommendations</a:t>
             </a:r>
             <a:endParaRPr lang="en-US" dirty="0"/>
@@ -10044,60 +10005,66 @@
           <a:lstStyle/>
           <a:p>
             <a:r>
-              <a:rPr lang="de-DE" b="1" dirty="0" smtClean="0"/>
+              <a:rPr lang="de-DE" b="1" dirty="0"/>
               <a:t>WoT Architecture</a:t>
             </a:r>
           </a:p>
           <a:p>
             <a:pPr lvl="1"/>
             <a:r>
-              <a:rPr lang="de-DE" dirty="0" smtClean="0"/>
+              <a:rPr lang="de-DE" dirty="0"/>
               <a:t>Constraints that define the difference between IoT and W3C WoT</a:t>
             </a:r>
           </a:p>
           <a:p>
             <a:pPr lvl="1"/>
             <a:r>
-              <a:rPr lang="de-DE" dirty="0" smtClean="0"/>
+              <a:rPr lang="de-DE" dirty="0"/>
               <a:t>Definition of Interaction Affordances</a:t>
             </a:r>
           </a:p>
           <a:p>
             <a:pPr lvl="1"/>
             <a:r>
-              <a:rPr lang="de-DE" dirty="0" smtClean="0"/>
+              <a:rPr lang="de-DE" dirty="0"/>
               <a:t>Definition of Web forms</a:t>
             </a:r>
           </a:p>
           <a:p>
             <a:pPr lvl="1"/>
-            <a:endParaRPr lang="de-DE" dirty="0" smtClean="0"/>
+            <a:endParaRPr lang="de-DE" dirty="0"/>
+          </a:p>
+          <a:p>
+            <a:pPr marL="360000" lvl="1" indent="0">
+              <a:buNone/>
+            </a:pPr>
+            <a:endParaRPr lang="de-DE" dirty="0"/>
           </a:p>
           <a:p>
             <a:pPr lvl="1"/>
             <a:r>
-              <a:rPr lang="de-DE" dirty="0" smtClean="0"/>
+              <a:rPr lang="de-DE" dirty="0"/>
               <a:t>Use cases and requirements</a:t>
             </a:r>
           </a:p>
           <a:p>
             <a:pPr lvl="1"/>
             <a:r>
-              <a:rPr lang="de-DE" dirty="0" smtClean="0"/>
+              <a:rPr lang="de-DE" dirty="0"/>
               <a:t>Terminology</a:t>
             </a:r>
           </a:p>
           <a:p>
             <a:pPr lvl="1"/>
             <a:r>
-              <a:rPr lang="de-DE" dirty="0" smtClean="0"/>
+              <a:rPr lang="de-DE" dirty="0"/>
               <a:t>Interplay of W3C WoT building blocks</a:t>
             </a:r>
           </a:p>
           <a:p>
             <a:pPr lvl="1"/>
             <a:r>
-              <a:rPr lang="de-DE" dirty="0" smtClean="0"/>
+              <a:rPr lang="de-DE" dirty="0"/>
               <a:t>Examples</a:t>
             </a:r>
             <a:endParaRPr lang="en-US" dirty="0"/>
@@ -10125,50 +10092,50 @@
           <a:lstStyle/>
           <a:p>
             <a:r>
-              <a:rPr lang="de-DE" b="1" dirty="0" smtClean="0"/>
+              <a:rPr lang="de-DE" b="1" dirty="0"/>
               <a:t>WoT Thing Description (TD)</a:t>
             </a:r>
           </a:p>
           <a:p>
             <a:pPr lvl="1"/>
             <a:r>
-              <a:rPr lang="de-DE" dirty="0" smtClean="0"/>
+              <a:rPr lang="de-DE" dirty="0"/>
               <a:t>Information model &amp; representation format for Thing metadata, generic data model, and hypermedia-based interface desriptions</a:t>
             </a:r>
           </a:p>
           <a:p>
             <a:pPr lvl="1"/>
-            <a:endParaRPr lang="de-DE" dirty="0" smtClean="0"/>
+            <a:endParaRPr lang="de-DE" dirty="0"/>
           </a:p>
           <a:p>
             <a:pPr lvl="1"/>
-            <a:endParaRPr lang="de-DE" dirty="0" smtClean="0"/>
+            <a:endParaRPr lang="de-DE" dirty="0"/>
           </a:p>
           <a:p>
             <a:pPr lvl="1"/>
             <a:r>
-              <a:rPr lang="de-DE" dirty="0" smtClean="0"/>
+              <a:rPr lang="de-DE" dirty="0"/>
               <a:t>Namespace and vocabulary definitions</a:t>
             </a:r>
           </a:p>
           <a:p>
             <a:pPr lvl="1"/>
             <a:r>
-              <a:rPr lang="de-DE" dirty="0" smtClean="0"/>
+              <a:rPr lang="de-DE" dirty="0"/>
               <a:t>Parsing and serialization rules</a:t>
             </a:r>
           </a:p>
           <a:p>
             <a:pPr lvl="1"/>
             <a:r>
-              <a:rPr lang="de-DE" dirty="0" smtClean="0"/>
+              <a:rPr lang="de-DE" dirty="0"/>
               <a:t>Extension points</a:t>
             </a:r>
           </a:p>
           <a:p>
             <a:pPr lvl="1"/>
             <a:r>
-              <a:rPr lang="de-DE" dirty="0" smtClean="0"/>
+              <a:rPr lang="de-DE" dirty="0"/>
               <a:t>Examples</a:t>
             </a:r>
             <a:endParaRPr lang="en-US" dirty="0"/>
@@ -10185,13 +10152,6 @@
   <p:clrMapOvr>
     <a:masterClrMapping/>
   </p:clrMapOvr>
-  <p:timing>
-    <p:tnLst>
-      <p:par>
-        <p:cTn id="1" dur="indefinite" restart="never" nodeType="tmRoot"/>
-      </p:par>
-    </p:tnLst>
-  </p:timing>
 </p:sld>
 </file>
 
@@ -10228,7 +10188,7 @@
           <a:lstStyle/>
           <a:p>
             <a:r>
-              <a:rPr lang="de-DE" dirty="0" smtClean="0"/>
+              <a:rPr lang="de-DE" dirty="0"/>
               <a:t>Published Candidate Recommendations</a:t>
             </a:r>
             <a:endParaRPr lang="en-US" dirty="0"/>
@@ -10247,7 +10207,7 @@
         </p:nvSpPr>
         <p:spPr>
           <a:xfrm>
-            <a:off x="6200828" y="1600201"/>
+            <a:off x="6228136" y="1143000"/>
             <a:ext cx="5514971" cy="4525963"/>
           </a:xfrm>
         </p:spPr>
@@ -10256,7 +10216,7 @@
           <a:lstStyle/>
           <a:p>
             <a:r>
-              <a:rPr lang="de-DE" b="1" dirty="0" smtClean="0"/>
+              <a:rPr lang="de-DE" b="1" dirty="0"/>
               <a:t>WoT Thing Description (TD)</a:t>
             </a:r>
           </a:p>
@@ -10270,7 +10230,7 @@
         </p:nvSpPr>
         <p:spPr>
           <a:xfrm>
-            <a:off x="6819255" y="2181185"/>
+            <a:off x="6787225" y="1625991"/>
             <a:ext cx="3888432" cy="4593565"/>
           </a:xfrm>
           <a:prstGeom prst="rect">
@@ -10578,25 +10538,10 @@
                 <a:uFillTx/>
                 <a:latin typeface="Consolas" panose="020B0609020204030204" pitchFamily="49" charset="0"/>
               </a:rPr>
-              <a:t>"https://</a:t>
-            </a:r>
-            <a:r>
-              <a:rPr kumimoji="0" lang="de-DE" sz="1300" b="1" i="0" u="none" strike="noStrike" kern="1200" cap="none" spc="0" normalizeH="0" baseline="0" noProof="0" dirty="0" smtClean="0">
-                <a:ln>
-                  <a:noFill/>
-                </a:ln>
-                <a:solidFill>
-                  <a:srgbClr val="4A7B7C"/>
-                </a:solidFill>
-                <a:effectLst/>
-                <a:uLnTx/>
-                <a:uFillTx/>
-                <a:latin typeface="Consolas" panose="020B0609020204030204" pitchFamily="49" charset="0"/>
-              </a:rPr>
-              <a:t>www.w3.org/2019/wot/td/v1"</a:t>
-            </a:r>
-            <a:r>
-              <a:rPr kumimoji="0" lang="de-DE" sz="1300" b="0" i="0" u="none" strike="noStrike" kern="1200" cap="none" spc="0" normalizeH="0" baseline="0" noProof="0" dirty="0" smtClean="0">
+              <a:t>"https://www.w3.org/2019/wot/td/v1"</a:t>
+            </a:r>
+            <a:r>
+              <a:rPr kumimoji="0" lang="de-DE" sz="1300" b="0" i="0" u="none" strike="noStrike" kern="1200" cap="none" spc="0" normalizeH="0" baseline="0" noProof="0" dirty="0">
                 <a:ln>
                   <a:noFill/>
                 </a:ln>
@@ -11397,67 +11342,37 @@
                 <a:uFillTx/>
                 <a:latin typeface="Consolas" panose="020B0609020204030204" pitchFamily="49" charset="0"/>
               </a:rPr>
-              <a:t>: </a:t>
-            </a:r>
-            <a:r>
-              <a:rPr kumimoji="0" lang="de-DE" sz="1300" b="0" i="0" u="none" strike="noStrike" kern="1200" cap="none" spc="0" normalizeH="0" baseline="0" noProof="0" dirty="0" smtClean="0">
+              <a:t>: [</a:t>
+            </a:r>
+            <a:r>
+              <a:rPr kumimoji="0" lang="de-DE" sz="1300" b="0" i="0" u="none" strike="noStrike" kern="1200" cap="none" spc="0" normalizeH="0" baseline="0" noProof="0" dirty="0">
                 <a:ln>
                   <a:noFill/>
                 </a:ln>
                 <a:solidFill>
-                  <a:srgbClr val="000000"/>
+                  <a:srgbClr val="4A7B7C"/>
                 </a:solidFill>
                 <a:effectLst/>
                 <a:uLnTx/>
                 <a:uFillTx/>
                 <a:latin typeface="Consolas" panose="020B0609020204030204" pitchFamily="49" charset="0"/>
               </a:rPr>
-              <a:t>[</a:t>
-            </a:r>
-            <a:r>
-              <a:rPr kumimoji="0" lang="de-DE" sz="1300" b="0" i="0" u="none" strike="noStrike" kern="1200" cap="none" spc="0" normalizeH="0" baseline="0" noProof="0" dirty="0" smtClean="0">
+              <a:t>"default"</a:t>
+            </a:r>
+            <a:r>
+              <a:rPr kumimoji="0" lang="de-DE" sz="1300" b="0" i="0" u="none" strike="noStrike" kern="1200" cap="none" spc="0" normalizeH="0" baseline="0" noProof="0" dirty="0">
                 <a:ln>
                   <a:noFill/>
                 </a:ln>
                 <a:solidFill>
-                  <a:srgbClr val="4A7B7C"/>
+                  <a:srgbClr val="000000"/>
                 </a:solidFill>
                 <a:effectLst/>
                 <a:uLnTx/>
                 <a:uFillTx/>
                 <a:latin typeface="Consolas" panose="020B0609020204030204" pitchFamily="49" charset="0"/>
               </a:rPr>
-              <a:t>"default"</a:t>
-            </a:r>
-            <a:r>
-              <a:rPr kumimoji="0" lang="de-DE" sz="1300" b="0" i="0" u="none" strike="noStrike" kern="1200" cap="none" spc="0" normalizeH="0" baseline="0" noProof="0" dirty="0" smtClean="0">
-                <a:ln>
-                  <a:noFill/>
-                </a:ln>
-                <a:solidFill>
-                  <a:srgbClr val="000000"/>
-                </a:solidFill>
-                <a:effectLst/>
-                <a:uLnTx/>
-                <a:uFillTx/>
-                <a:latin typeface="Consolas" panose="020B0609020204030204" pitchFamily="49" charset="0"/>
-              </a:rPr>
-              <a:t>: </a:t>
-            </a:r>
-            <a:r>
-              <a:rPr kumimoji="0" lang="de-DE" sz="1300" b="0" i="0" u="none" strike="noStrike" kern="1200" cap="none" spc="0" normalizeH="0" baseline="0" noProof="0" dirty="0">
-                <a:ln>
-                  <a:noFill/>
-                </a:ln>
-                <a:solidFill>
-                  <a:srgbClr val="000000"/>
-                </a:solidFill>
-                <a:effectLst/>
-                <a:uLnTx/>
-                <a:uFillTx/>
-                <a:latin typeface="Consolas" panose="020B0609020204030204" pitchFamily="49" charset="0"/>
-              </a:rPr>
-              <a:t>{</a:t>
+              <a:t>: {</a:t>
             </a:r>
             <a:endParaRPr kumimoji="0" lang="de-DE" sz="1300" b="0" i="0" u="none" strike="noStrike" kern="1200" cap="none" spc="0" normalizeH="0" baseline="0" noProof="0" dirty="0">
               <a:ln>
@@ -11538,7 +11453,7 @@
               <a:t>: </a:t>
             </a:r>
             <a:r>
-              <a:rPr kumimoji="0" lang="de-DE" sz="1300" b="0" i="0" u="none" strike="noStrike" kern="1200" cap="none" spc="0" normalizeH="0" baseline="0" noProof="0" dirty="0" smtClean="0">
+              <a:rPr kumimoji="0" lang="de-DE" sz="1300" b="0" i="0" u="none" strike="noStrike" kern="1200" cap="none" spc="0" normalizeH="0" baseline="0" noProof="0" dirty="0">
                 <a:ln>
                   <a:noFill/>
                 </a:ln>
@@ -11578,7 +11493,7 @@
               <a:defRPr/>
             </a:pPr>
             <a:r>
-              <a:rPr kumimoji="0" lang="de-DE" sz="1300" b="0" i="0" u="none" strike="noStrike" kern="1200" cap="none" spc="0" normalizeH="0" baseline="0" noProof="0" dirty="0" smtClean="0">
+              <a:rPr kumimoji="0" lang="de-DE" sz="1300" b="0" i="0" u="none" strike="noStrike" kern="1200" cap="none" spc="0" normalizeH="0" baseline="0" noProof="0" dirty="0">
                 <a:ln>
                   <a:noFill/>
                 </a:ln>
@@ -11592,18 +11507,6 @@
               </a:rPr>
               <a:t>  }],</a:t>
             </a:r>
-            <a:endParaRPr kumimoji="0" lang="de-DE" sz="1300" b="0" i="0" u="none" strike="noStrike" kern="1200" cap="none" spc="0" normalizeH="0" baseline="0" noProof="0" dirty="0">
-              <a:ln>
-                <a:noFill/>
-              </a:ln>
-              <a:solidFill>
-                <a:srgbClr val="000000"/>
-              </a:solidFill>
-              <a:effectLst/>
-              <a:uLnTx/>
-              <a:uFillTx/>
-              <a:latin typeface="Consolas" panose="020B0609020204030204" pitchFamily="49" charset="0"/>
-            </a:endParaRPr>
           </a:p>
           <a:p>
             <a:pPr lvl="0">
@@ -11640,34 +11543,19 @@
                 <a:uFillTx/>
                 <a:latin typeface="Consolas" panose="020B0609020204030204" pitchFamily="49" charset="0"/>
               </a:rPr>
-              <a:t>: </a:t>
-            </a:r>
-            <a:r>
-              <a:rPr kumimoji="0" lang="de-DE" sz="1300" b="0" i="0" u="none" strike="noStrike" kern="1200" cap="none" spc="0" normalizeH="0" baseline="0" noProof="0" dirty="0" smtClean="0">
-                <a:ln>
-                  <a:noFill/>
-                </a:ln>
-                <a:solidFill>
-                  <a:srgbClr val="000000"/>
-                </a:solidFill>
-                <a:effectLst/>
-                <a:uLnTx/>
-                <a:uFillTx/>
+              <a:t>: [</a:t>
+            </a:r>
+            <a:r>
+              <a:rPr lang="de-DE" sz="1300" dirty="0">
+                <a:solidFill>
+                  <a:srgbClr val="4A7B7C"/>
+                </a:solidFill>
                 <a:latin typeface="Consolas" panose="020B0609020204030204" pitchFamily="49" charset="0"/>
               </a:rPr>
-              <a:t>[</a:t>
-            </a:r>
-            <a:r>
-              <a:rPr lang="de-DE" sz="1300" dirty="0" smtClean="0">
-                <a:solidFill>
-                  <a:srgbClr val="4A7B7C"/>
-                </a:solidFill>
-                <a:latin typeface="Consolas" panose="020B0609020204030204" pitchFamily="49" charset="0"/>
-              </a:rPr>
               <a:t>"default"</a:t>
             </a:r>
             <a:r>
-              <a:rPr kumimoji="0" lang="de-DE" sz="1300" b="0" i="0" u="none" strike="noStrike" kern="1200" cap="none" spc="0" normalizeH="0" baseline="0" noProof="0" dirty="0" smtClean="0">
+              <a:rPr kumimoji="0" lang="de-DE" sz="1300" b="0" i="0" u="none" strike="noStrike" kern="1200" cap="none" spc="0" normalizeH="0" baseline="0" noProof="0" dirty="0">
                 <a:ln>
                   <a:noFill/>
                 </a:ln>
@@ -11842,22 +11730,7 @@
                 <a:uFillTx/>
                 <a:latin typeface="Consolas" panose="020B0609020204030204" pitchFamily="49" charset="0"/>
               </a:rPr>
-              <a:t>: </a:t>
-            </a:r>
-            <a:r>
-              <a:rPr kumimoji="0" lang="de-DE" sz="1300" b="0" i="0" u="none" strike="noStrike" kern="1200" cap="none" spc="0" normalizeH="0" baseline="0" noProof="0" dirty="0" smtClean="0">
-                <a:ln>
-                  <a:noFill/>
-                </a:ln>
-                <a:solidFill>
-                  <a:srgbClr val="000000"/>
-                </a:solidFill>
-                <a:effectLst/>
-                <a:uLnTx/>
-                <a:uFillTx/>
-                <a:latin typeface="Consolas" panose="020B0609020204030204" pitchFamily="49" charset="0"/>
-              </a:rPr>
-              <a:t>{</a:t>
+              <a:t>: {</a:t>
             </a:r>
             <a:endParaRPr lang="de-DE" sz="1300" dirty="0">
               <a:solidFill>
@@ -11907,19 +11780,10 @@
                 </a:solidFill>
                 <a:latin typeface="Consolas" panose="020B0609020204030204" pitchFamily="49" charset="0"/>
               </a:rPr>
-              <a:t>"iot:Brightness</a:t>
-            </a:r>
-            <a:r>
-              <a:rPr lang="de-DE" sz="1300" b="1" dirty="0" smtClean="0">
-                <a:solidFill>
-                  <a:srgbClr val="C0504D"/>
-                </a:solidFill>
-                <a:latin typeface="Consolas" panose="020B0609020204030204" pitchFamily="49" charset="0"/>
-              </a:rPr>
-              <a:t>"</a:t>
-            </a:r>
-            <a:r>
-              <a:rPr lang="de-DE" sz="1300" dirty="0" smtClean="0">
+              <a:t>"iot:Brightness"</a:t>
+            </a:r>
+            <a:r>
+              <a:rPr lang="de-DE" sz="1300" dirty="0">
                 <a:solidFill>
                   <a:srgbClr val="000000"/>
                 </a:solidFill>
@@ -12205,22 +12069,7 @@
                 <a:uFillTx/>
                 <a:latin typeface="Consolas" panose="020B0609020204030204" pitchFamily="49" charset="0"/>
               </a:rPr>
-              <a:t> 100</a:t>
-            </a:r>
-            <a:r>
-              <a:rPr kumimoji="0" lang="de-DE" sz="1300" b="0" i="0" u="none" strike="noStrike" kern="1200" cap="none" spc="0" normalizeH="0" baseline="0" noProof="0" dirty="0" smtClean="0">
-                <a:ln>
-                  <a:noFill/>
-                </a:ln>
-                <a:solidFill>
-                  <a:srgbClr val="FF0066"/>
-                </a:solidFill>
-                <a:effectLst/>
-                <a:uLnTx/>
-                <a:uFillTx/>
-                <a:latin typeface="Consolas" panose="020B0609020204030204" pitchFamily="49" charset="0"/>
-              </a:rPr>
-              <a:t>,</a:t>
+              <a:t> 100,</a:t>
             </a:r>
             <a:endParaRPr lang="de-DE" sz="1300" dirty="0">
               <a:solidFill>
@@ -12249,7 +12098,7 @@
               <a:defRPr/>
             </a:pPr>
             <a:r>
-              <a:rPr kumimoji="0" lang="de-DE" sz="1300" b="1" i="0" u="none" strike="noStrike" kern="1200" cap="none" spc="0" normalizeH="0" baseline="0" noProof="0" dirty="0" smtClean="0">
+              <a:rPr kumimoji="0" lang="de-DE" sz="1300" b="1" i="0" u="none" strike="noStrike" kern="1200" cap="none" spc="0" normalizeH="0" baseline="0" noProof="0" dirty="0">
                 <a:ln>
                   <a:noFill/>
                 </a:ln>
@@ -12264,7 +12113,7 @@
               <a:t>      </a:t>
             </a:r>
             <a:r>
-              <a:rPr kumimoji="0" lang="de-DE" sz="1300" b="1" i="0" u="none" strike="noStrike" kern="1200" cap="none" spc="0" normalizeH="0" baseline="0" noProof="0" dirty="0" smtClean="0">
+              <a:rPr kumimoji="0" lang="de-DE" sz="1300" b="1" i="0" u="none" strike="noStrike" kern="1200" cap="none" spc="0" normalizeH="0" baseline="0" noProof="0" dirty="0">
                 <a:ln>
                   <a:noFill/>
                 </a:ln>
@@ -12276,22 +12125,7 @@
                 <a:uFillTx/>
                 <a:latin typeface="Consolas" panose="020B0609020204030204" pitchFamily="49" charset="0"/>
               </a:rPr>
-              <a:t>"</a:t>
-            </a:r>
-            <a:r>
-              <a:rPr kumimoji="0" lang="de-DE" sz="1300" b="1" i="0" u="none" strike="noStrike" kern="1200" cap="none" spc="0" normalizeH="0" baseline="0" noProof="0" dirty="0">
-                <a:ln>
-                  <a:noFill/>
-                </a:ln>
-                <a:solidFill>
-                  <a:srgbClr val="00B050"/>
-                </a:solidFill>
-                <a:effectLst/>
-                <a:uLnTx/>
-                <a:uFillTx/>
-                <a:latin typeface="Consolas" panose="020B0609020204030204" pitchFamily="49" charset="0"/>
-              </a:rPr>
-              <a:t>forms"</a:t>
+              <a:t>"forms"</a:t>
             </a:r>
             <a:r>
               <a:rPr kumimoji="0" lang="de-DE" sz="1300" b="0" i="0" u="none" strike="noStrike" kern="1200" cap="none" spc="0" normalizeH="0" baseline="0" noProof="0" dirty="0">
@@ -12562,22 +12396,7 @@
                 <a:uFillTx/>
                 <a:latin typeface="Consolas" panose="020B0609020204030204" pitchFamily="49" charset="0"/>
               </a:rPr>
-              <a:t>: </a:t>
-            </a:r>
-            <a:r>
-              <a:rPr kumimoji="0" lang="de-DE" sz="1300" b="0" i="0" u="none" strike="noStrike" kern="1200" cap="none" spc="0" normalizeH="0" baseline="0" noProof="0" dirty="0" smtClean="0">
-                <a:ln>
-                  <a:noFill/>
-                </a:ln>
-                <a:solidFill>
-                  <a:srgbClr val="000000"/>
-                </a:solidFill>
-                <a:effectLst/>
-                <a:uLnTx/>
-                <a:uFillTx/>
-                <a:latin typeface="Consolas" panose="020B0609020204030204" pitchFamily="49" charset="0"/>
-              </a:rPr>
-              <a:t>{</a:t>
+              <a:t>: {</a:t>
             </a:r>
           </a:p>
           <a:p>
@@ -12607,18 +12426,7 @@
                 <a:ea typeface="Calibri"/>
                 <a:cs typeface="Times New Roman"/>
               </a:rPr>
-              <a:t> </a:t>
-            </a:r>
-            <a:r>
-              <a:rPr lang="de-DE" sz="1300" dirty="0" smtClean="0">
-                <a:solidFill>
-                  <a:srgbClr val="000000"/>
-                </a:solidFill>
-                <a:latin typeface="Consolas" panose="020B0609020204030204" pitchFamily="49" charset="0"/>
-                <a:ea typeface="Calibri"/>
-                <a:cs typeface="Times New Roman"/>
-              </a:rPr>
-              <a:t>     ...</a:t>
+              <a:t>      ...</a:t>
             </a:r>
             <a:endParaRPr kumimoji="0" lang="de-DE" sz="1300" b="0" i="0" u="none" strike="noStrike" kern="1200" cap="none" spc="0" normalizeH="0" baseline="0" noProof="0" dirty="0">
               <a:ln>
@@ -12637,536 +12445,557 @@
           </a:p>
         </p:txBody>
       </p:sp>
-      <p:pic>
-        <p:nvPicPr>
-          <p:cNvPr id="10" name="Picture 9"/>
-          <p:cNvPicPr>
-            <a:picLocks noChangeAspect="1"/>
-          </p:cNvPicPr>
-          <p:nvPr/>
-        </p:nvPicPr>
-        <p:blipFill>
-          <a:blip r:embed="rId2" cstate="print">
+      <p:grpSp>
+        <p:nvGrpSpPr>
+          <p:cNvPr id="6" name="Group 5">
             <a:extLst>
-              <a:ext uri="{28A0092B-C50C-407E-A947-70E740481C1C}">
-                <a14:useLocalDpi xmlns:a14="http://schemas.microsoft.com/office/drawing/2010/main" val="0"/>
+              <a:ext uri="{FF2B5EF4-FFF2-40B4-BE49-F238E27FC236}">
+                <a16:creationId xmlns:a16="http://schemas.microsoft.com/office/drawing/2014/main" id="{EACB09F6-4094-4071-8EF0-8E4411D2DA75}"/>
               </a:ext>
             </a:extLst>
-          </a:blip>
-          <a:stretch>
-            <a:fillRect/>
-          </a:stretch>
-        </p:blipFill>
-        <p:spPr>
+          </p:cNvPr>
+          <p:cNvGrpSpPr/>
+          <p:nvPr/>
+        </p:nvGrpSpPr>
+        <p:grpSpPr>
           <a:xfrm>
-            <a:off x="1202631" y="5392042"/>
-            <a:ext cx="1116361" cy="1116361"/>
+            <a:off x="1065749" y="4797152"/>
+            <a:ext cx="4825866" cy="1885836"/>
+            <a:chOff x="1065749" y="5147330"/>
+            <a:chExt cx="4825866" cy="1885836"/>
           </a:xfrm>
-          <a:prstGeom prst="rect">
-            <a:avLst/>
-          </a:prstGeom>
-        </p:spPr>
-      </p:pic>
-      <p:pic>
-        <p:nvPicPr>
-          <p:cNvPr id="11" name="Picture 10"/>
-          <p:cNvPicPr>
-            <a:picLocks noChangeAspect="1"/>
-          </p:cNvPicPr>
-          <p:nvPr/>
-        </p:nvPicPr>
-        <p:blipFill>
-          <a:blip r:embed="rId3" cstate="print">
-            <a:extLst>
-              <a:ext uri="{28A0092B-C50C-407E-A947-70E740481C1C}">
-                <a14:useLocalDpi xmlns:a14="http://schemas.microsoft.com/office/drawing/2010/main" val="0"/>
-              </a:ext>
-            </a:extLst>
-          </a:blip>
-          <a:stretch>
-            <a:fillRect/>
-          </a:stretch>
-        </p:blipFill>
-        <p:spPr>
-          <a:xfrm>
-            <a:off x="4838879" y="5980430"/>
-            <a:ext cx="1052736" cy="1052736"/>
-          </a:xfrm>
-          <a:prstGeom prst="rect">
-            <a:avLst/>
-          </a:prstGeom>
-        </p:spPr>
-      </p:pic>
-      <p:pic>
-        <p:nvPicPr>
-          <p:cNvPr id="12" name="Picture 11"/>
-          <p:cNvPicPr>
-            <a:picLocks noChangeAspect="1"/>
-          </p:cNvPicPr>
-          <p:nvPr/>
-        </p:nvPicPr>
-        <p:blipFill>
-          <a:blip r:embed="rId4" cstate="print">
-            <a:extLst>
-              <a:ext uri="{28A0092B-C50C-407E-A947-70E740481C1C}">
-                <a14:useLocalDpi xmlns:a14="http://schemas.microsoft.com/office/drawing/2010/main" val="0"/>
-              </a:ext>
-            </a:extLst>
-          </a:blip>
-          <a:stretch>
-            <a:fillRect/>
-          </a:stretch>
-        </p:blipFill>
-        <p:spPr>
-          <a:xfrm>
-            <a:off x="4587726" y="5147330"/>
-            <a:ext cx="971104" cy="971104"/>
-          </a:xfrm>
-          <a:prstGeom prst="rect">
-            <a:avLst/>
-          </a:prstGeom>
-        </p:spPr>
-      </p:pic>
-      <p:sp>
-        <p:nvSpPr>
-          <p:cNvPr id="13" name="Oval 12"/>
-          <p:cNvSpPr/>
-          <p:nvPr/>
-        </p:nvSpPr>
-        <p:spPr>
-          <a:xfrm>
-            <a:off x="1866507" y="5902738"/>
-            <a:ext cx="144000" cy="144000"/>
-          </a:xfrm>
-          <a:prstGeom prst="ellipse">
-            <a:avLst/>
-          </a:prstGeom>
-          <a:gradFill flip="none" rotWithShape="1">
-            <a:gsLst>
-              <a:gs pos="0">
-                <a:schemeClr val="bg1">
-                  <a:lumMod val="85000"/>
-                  <a:shade val="30000"/>
-                  <a:satMod val="115000"/>
-                </a:schemeClr>
-              </a:gs>
-              <a:gs pos="50000">
-                <a:schemeClr val="bg1">
-                  <a:lumMod val="85000"/>
-                  <a:shade val="67500"/>
-                  <a:satMod val="115000"/>
-                </a:schemeClr>
-              </a:gs>
-              <a:gs pos="100000">
-                <a:schemeClr val="bg1">
-                  <a:lumMod val="85000"/>
-                  <a:shade val="100000"/>
-                  <a:satMod val="115000"/>
-                </a:schemeClr>
-              </a:gs>
-            </a:gsLst>
-            <a:path path="circle">
-              <a:fillToRect l="100000" t="100000"/>
-            </a:path>
-            <a:tileRect r="-100000" b="-100000"/>
-          </a:gradFill>
-          <a:ln>
-            <a:solidFill>
+        </p:grpSpPr>
+        <p:pic>
+          <p:nvPicPr>
+            <p:cNvPr id="10" name="Picture 9"/>
+            <p:cNvPicPr>
+              <a:picLocks noChangeAspect="1"/>
+            </p:cNvPicPr>
+            <p:nvPr/>
+          </p:nvPicPr>
+          <p:blipFill>
+            <a:blip r:embed="rId2" cstate="print">
+              <a:extLst>
+                <a:ext uri="{28A0092B-C50C-407E-A947-70E740481C1C}">
+                  <a14:useLocalDpi xmlns:a14="http://schemas.microsoft.com/office/drawing/2010/main" val="0"/>
+                </a:ext>
+              </a:extLst>
+            </a:blip>
+            <a:stretch>
+              <a:fillRect/>
+            </a:stretch>
+          </p:blipFill>
+          <p:spPr>
+            <a:xfrm>
+              <a:off x="1202631" y="5392042"/>
+              <a:ext cx="1116361" cy="1116361"/>
+            </a:xfrm>
+            <a:prstGeom prst="rect">
+              <a:avLst/>
+            </a:prstGeom>
+          </p:spPr>
+        </p:pic>
+        <p:pic>
+          <p:nvPicPr>
+            <p:cNvPr id="11" name="Picture 10"/>
+            <p:cNvPicPr>
+              <a:picLocks noChangeAspect="1"/>
+            </p:cNvPicPr>
+            <p:nvPr/>
+          </p:nvPicPr>
+          <p:blipFill>
+            <a:blip r:embed="rId3" cstate="print">
+              <a:extLst>
+                <a:ext uri="{28A0092B-C50C-407E-A947-70E740481C1C}">
+                  <a14:useLocalDpi xmlns:a14="http://schemas.microsoft.com/office/drawing/2010/main" val="0"/>
+                </a:ext>
+              </a:extLst>
+            </a:blip>
+            <a:stretch>
+              <a:fillRect/>
+            </a:stretch>
+          </p:blipFill>
+          <p:spPr>
+            <a:xfrm>
+              <a:off x="4838879" y="5980430"/>
+              <a:ext cx="1052736" cy="1052736"/>
+            </a:xfrm>
+            <a:prstGeom prst="rect">
+              <a:avLst/>
+            </a:prstGeom>
+          </p:spPr>
+        </p:pic>
+        <p:pic>
+          <p:nvPicPr>
+            <p:cNvPr id="12" name="Picture 11"/>
+            <p:cNvPicPr>
+              <a:picLocks noChangeAspect="1"/>
+            </p:cNvPicPr>
+            <p:nvPr/>
+          </p:nvPicPr>
+          <p:blipFill>
+            <a:blip r:embed="rId4" cstate="print">
+              <a:extLst>
+                <a:ext uri="{28A0092B-C50C-407E-A947-70E740481C1C}">
+                  <a14:useLocalDpi xmlns:a14="http://schemas.microsoft.com/office/drawing/2010/main" val="0"/>
+                </a:ext>
+              </a:extLst>
+            </a:blip>
+            <a:stretch>
+              <a:fillRect/>
+            </a:stretch>
+          </p:blipFill>
+          <p:spPr>
+            <a:xfrm>
+              <a:off x="4587726" y="5147330"/>
+              <a:ext cx="971104" cy="971104"/>
+            </a:xfrm>
+            <a:prstGeom prst="rect">
+              <a:avLst/>
+            </a:prstGeom>
+          </p:spPr>
+        </p:pic>
+        <p:sp>
+          <p:nvSpPr>
+            <p:cNvPr id="13" name="Oval 12"/>
+            <p:cNvSpPr/>
+            <p:nvPr/>
+          </p:nvSpPr>
+          <p:spPr>
+            <a:xfrm>
+              <a:off x="1866507" y="5902738"/>
+              <a:ext cx="144000" cy="144000"/>
+            </a:xfrm>
+            <a:prstGeom prst="ellipse">
+              <a:avLst/>
+            </a:prstGeom>
+            <a:gradFill flip="none" rotWithShape="1">
+              <a:gsLst>
+                <a:gs pos="0">
+                  <a:schemeClr val="bg1">
+                    <a:lumMod val="85000"/>
+                    <a:shade val="30000"/>
+                    <a:satMod val="115000"/>
+                  </a:schemeClr>
+                </a:gs>
+                <a:gs pos="50000">
+                  <a:schemeClr val="bg1">
+                    <a:lumMod val="85000"/>
+                    <a:shade val="67500"/>
+                    <a:satMod val="115000"/>
+                  </a:schemeClr>
+                </a:gs>
+                <a:gs pos="100000">
+                  <a:schemeClr val="bg1">
+                    <a:lumMod val="85000"/>
+                    <a:shade val="100000"/>
+                    <a:satMod val="115000"/>
+                  </a:schemeClr>
+                </a:gs>
+              </a:gsLst>
+              <a:path path="circle">
+                <a:fillToRect l="100000" t="100000"/>
+              </a:path>
+              <a:tileRect r="-100000" b="-100000"/>
+            </a:gradFill>
+            <a:ln>
+              <a:solidFill>
+                <a:schemeClr val="tx1"/>
+              </a:solidFill>
+            </a:ln>
+          </p:spPr>
+          <p:style>
+            <a:lnRef idx="2">
+              <a:schemeClr val="accent2">
+                <a:shade val="50000"/>
+              </a:schemeClr>
+            </a:lnRef>
+            <a:fillRef idx="1">
+              <a:schemeClr val="accent2"/>
+            </a:fillRef>
+            <a:effectRef idx="0">
+              <a:schemeClr val="accent2"/>
+            </a:effectRef>
+            <a:fontRef idx="minor">
+              <a:schemeClr val="lt1"/>
+            </a:fontRef>
+          </p:style>
+          <p:txBody>
+            <a:bodyPr rtlCol="0" anchor="ctr"/>
+            <a:lstStyle/>
+            <a:p>
+              <a:pPr algn="ctr"/>
+              <a:endParaRPr lang="en-US"/>
+            </a:p>
+          </p:txBody>
+        </p:sp>
+        <p:sp>
+          <p:nvSpPr>
+            <p:cNvPr id="14" name="TextBox 13"/>
+            <p:cNvSpPr txBox="1"/>
+            <p:nvPr/>
+          </p:nvSpPr>
+          <p:spPr>
+            <a:xfrm>
+              <a:off x="1065749" y="6481109"/>
+              <a:ext cx="1390124" cy="369332"/>
+            </a:xfrm>
+            <a:prstGeom prst="rect">
+              <a:avLst/>
+            </a:prstGeom>
+            <a:noFill/>
+          </p:spPr>
+          <p:txBody>
+            <a:bodyPr wrap="none" rtlCol="0">
+              <a:spAutoFit/>
+            </a:bodyPr>
+            <a:lstStyle/>
+            <a:p>
+              <a:r>
+                <a:rPr lang="de-DE" sz="1800" dirty="0"/>
+                <a:t>Door = Thing</a:t>
+              </a:r>
+              <a:endParaRPr lang="en-US" sz="1800" dirty="0"/>
+            </a:p>
+          </p:txBody>
+        </p:sp>
+        <p:sp>
+          <p:nvSpPr>
+            <p:cNvPr id="15" name="TextBox 14"/>
+            <p:cNvSpPr txBox="1"/>
+            <p:nvPr/>
+          </p:nvSpPr>
+          <p:spPr>
+            <a:xfrm>
+              <a:off x="1966177" y="5783948"/>
+              <a:ext cx="2106026" cy="369332"/>
+            </a:xfrm>
+            <a:prstGeom prst="rect">
+              <a:avLst/>
+            </a:prstGeom>
+            <a:noFill/>
+          </p:spPr>
+          <p:txBody>
+            <a:bodyPr wrap="none" rtlCol="0">
+              <a:spAutoFit/>
+            </a:bodyPr>
+            <a:lstStyle/>
+            <a:p>
+              <a:r>
+                <a:rPr lang="de-DE" sz="1800" dirty="0"/>
+                <a:t>Handle</a:t>
+              </a:r>
+              <a:r>
+                <a:rPr lang="de-DE" sz="1800" dirty="0">
+                  <a:solidFill>
+                    <a:srgbClr val="4A7B7C"/>
+                  </a:solidFill>
+                </a:rPr>
+                <a:t> </a:t>
+              </a:r>
+              <a:r>
+                <a:rPr lang="de-DE" sz="1800" dirty="0"/>
+                <a:t>= Affordance</a:t>
+              </a:r>
+              <a:endParaRPr lang="en-US" sz="1800" dirty="0"/>
+            </a:p>
+          </p:txBody>
+        </p:sp>
+        <p:sp>
+          <p:nvSpPr>
+            <p:cNvPr id="16" name="TextBox 15"/>
+            <p:cNvSpPr txBox="1"/>
+            <p:nvPr/>
+          </p:nvSpPr>
+          <p:spPr>
+            <a:xfrm>
+              <a:off x="2743899" y="6077096"/>
+              <a:ext cx="817340" cy="369332"/>
+            </a:xfrm>
+            <a:prstGeom prst="rect">
+              <a:avLst/>
+            </a:prstGeom>
+            <a:noFill/>
+          </p:spPr>
+          <p:txBody>
+            <a:bodyPr wrap="none" rtlCol="0">
+              <a:spAutoFit/>
+            </a:bodyPr>
+            <a:lstStyle/>
+            <a:p>
+              <a:pPr algn="ctr"/>
+              <a:r>
+                <a:rPr lang="de-DE" sz="1800" b="1" dirty="0">
+                  <a:solidFill>
+                    <a:srgbClr val="FF0000"/>
+                  </a:solidFill>
+                </a:rPr>
+                <a:t>What?</a:t>
+              </a:r>
+            </a:p>
+          </p:txBody>
+        </p:sp>
+        <p:sp>
+          <p:nvSpPr>
+            <p:cNvPr id="17" name="TextBox 16"/>
+            <p:cNvSpPr txBox="1"/>
+            <p:nvPr/>
+          </p:nvSpPr>
+          <p:spPr>
+            <a:xfrm>
+              <a:off x="3484902" y="6075283"/>
+              <a:ext cx="732445" cy="369332"/>
+            </a:xfrm>
+            <a:prstGeom prst="rect">
+              <a:avLst/>
+            </a:prstGeom>
+            <a:noFill/>
+          </p:spPr>
+          <p:txBody>
+            <a:bodyPr wrap="none" rtlCol="0">
+              <a:spAutoFit/>
+            </a:bodyPr>
+            <a:lstStyle/>
+            <a:p>
+              <a:pPr algn="ctr"/>
+              <a:r>
+                <a:rPr lang="de-DE" sz="1800" b="1" dirty="0">
+                  <a:solidFill>
+                    <a:srgbClr val="00B050"/>
+                  </a:solidFill>
+                </a:rPr>
+                <a:t>How?</a:t>
+              </a:r>
+              <a:endParaRPr lang="en-US" sz="1800" b="1" dirty="0">
+                <a:solidFill>
+                  <a:srgbClr val="00B050"/>
+                </a:solidFill>
+              </a:endParaRPr>
+            </a:p>
+          </p:txBody>
+        </p:sp>
+        <p:sp>
+          <p:nvSpPr>
+            <p:cNvPr id="18" name="Rectangle 17"/>
+            <p:cNvSpPr/>
+            <p:nvPr/>
+          </p:nvSpPr>
+          <p:spPr>
+            <a:xfrm>
+              <a:off x="2804557" y="6481109"/>
+              <a:ext cx="696024" cy="369332"/>
+            </a:xfrm>
+            <a:prstGeom prst="rect">
+              <a:avLst/>
+            </a:prstGeom>
+          </p:spPr>
+          <p:txBody>
+            <a:bodyPr wrap="none">
+              <a:spAutoFit/>
+            </a:bodyPr>
+            <a:lstStyle/>
+            <a:p>
+              <a:r>
+                <a:rPr lang="de-DE" sz="1800" dirty="0">
+                  <a:solidFill>
+                    <a:srgbClr val="FF0000"/>
+                  </a:solidFill>
+                </a:rPr>
+                <a:t>Open</a:t>
+              </a:r>
+              <a:endParaRPr lang="en-US" sz="1800" dirty="0">
+                <a:solidFill>
+                  <a:srgbClr val="FF0000"/>
+                </a:solidFill>
+              </a:endParaRPr>
+            </a:p>
+          </p:txBody>
+        </p:sp>
+        <p:cxnSp>
+          <p:nvCxnSpPr>
+            <p:cNvPr id="20" name="Straight Arrow Connector 19"/>
+            <p:cNvCxnSpPr/>
+            <p:nvPr/>
+          </p:nvCxnSpPr>
+          <p:spPr>
+            <a:xfrm flipV="1">
+              <a:off x="4212313" y="5895965"/>
+              <a:ext cx="614524" cy="323591"/>
+            </a:xfrm>
+            <a:prstGeom prst="straightConnector1">
+              <a:avLst/>
+            </a:prstGeom>
+            <a:ln>
+              <a:solidFill>
+                <a:schemeClr val="tx1"/>
+              </a:solidFill>
+              <a:tailEnd type="triangle"/>
+            </a:ln>
+          </p:spPr>
+          <p:style>
+            <a:lnRef idx="1">
+              <a:schemeClr val="accent1"/>
+            </a:lnRef>
+            <a:fillRef idx="0">
+              <a:schemeClr val="accent1"/>
+            </a:fillRef>
+            <a:effectRef idx="0">
+              <a:schemeClr val="accent1"/>
+            </a:effectRef>
+            <a:fontRef idx="minor">
               <a:schemeClr val="tx1"/>
-            </a:solidFill>
-          </a:ln>
-        </p:spPr>
-        <p:style>
-          <a:lnRef idx="2">
-            <a:schemeClr val="accent2">
-              <a:shade val="50000"/>
-            </a:schemeClr>
-          </a:lnRef>
-          <a:fillRef idx="1">
-            <a:schemeClr val="accent2"/>
-          </a:fillRef>
-          <a:effectRef idx="0">
-            <a:schemeClr val="accent2"/>
-          </a:effectRef>
-          <a:fontRef idx="minor">
-            <a:schemeClr val="lt1"/>
-          </a:fontRef>
-        </p:style>
-        <p:txBody>
-          <a:bodyPr rtlCol="0" anchor="ctr"/>
-          <a:lstStyle/>
-          <a:p>
-            <a:pPr algn="ctr"/>
-            <a:endParaRPr lang="en-US"/>
-          </a:p>
-        </p:txBody>
-      </p:sp>
-      <p:sp>
-        <p:nvSpPr>
-          <p:cNvPr id="14" name="TextBox 13"/>
-          <p:cNvSpPr txBox="1"/>
-          <p:nvPr/>
-        </p:nvSpPr>
-        <p:spPr>
-          <a:xfrm>
-            <a:off x="1065749" y="6481109"/>
-            <a:ext cx="1390124" cy="369332"/>
-          </a:xfrm>
-          <a:prstGeom prst="rect">
-            <a:avLst/>
-          </a:prstGeom>
-          <a:noFill/>
-        </p:spPr>
-        <p:txBody>
-          <a:bodyPr wrap="none" rtlCol="0">
-            <a:spAutoFit/>
-          </a:bodyPr>
-          <a:lstStyle/>
-          <a:p>
-            <a:r>
-              <a:rPr lang="de-DE" sz="1800" dirty="0" smtClean="0"/>
-              <a:t>Door = Thing</a:t>
-            </a:r>
-            <a:endParaRPr lang="en-US" sz="1800" dirty="0"/>
-          </a:p>
-        </p:txBody>
-      </p:sp>
-      <p:sp>
-        <p:nvSpPr>
-          <p:cNvPr id="15" name="TextBox 14"/>
-          <p:cNvSpPr txBox="1"/>
-          <p:nvPr/>
-        </p:nvSpPr>
-        <p:spPr>
-          <a:xfrm>
-            <a:off x="1966177" y="5783948"/>
-            <a:ext cx="2106026" cy="369332"/>
-          </a:xfrm>
-          <a:prstGeom prst="rect">
-            <a:avLst/>
-          </a:prstGeom>
-          <a:noFill/>
-        </p:spPr>
-        <p:txBody>
-          <a:bodyPr wrap="none" rtlCol="0">
-            <a:spAutoFit/>
-          </a:bodyPr>
-          <a:lstStyle/>
-          <a:p>
-            <a:r>
-              <a:rPr lang="de-DE" sz="1800" dirty="0" smtClean="0"/>
-              <a:t>Handle</a:t>
-            </a:r>
-            <a:r>
-              <a:rPr lang="de-DE" sz="1800" dirty="0" smtClean="0">
-                <a:solidFill>
-                  <a:srgbClr val="4A7B7C"/>
-                </a:solidFill>
-              </a:rPr>
-              <a:t> </a:t>
-            </a:r>
-            <a:r>
-              <a:rPr lang="de-DE" sz="1800" dirty="0" smtClean="0"/>
-              <a:t>= Affordance</a:t>
-            </a:r>
-            <a:endParaRPr lang="en-US" sz="1800" dirty="0"/>
-          </a:p>
-        </p:txBody>
-      </p:sp>
-      <p:sp>
-        <p:nvSpPr>
-          <p:cNvPr id="16" name="TextBox 15"/>
-          <p:cNvSpPr txBox="1"/>
-          <p:nvPr/>
-        </p:nvSpPr>
-        <p:spPr>
-          <a:xfrm>
-            <a:off x="2743899" y="6077096"/>
-            <a:ext cx="817340" cy="369332"/>
-          </a:xfrm>
-          <a:prstGeom prst="rect">
-            <a:avLst/>
-          </a:prstGeom>
-          <a:noFill/>
-        </p:spPr>
-        <p:txBody>
-          <a:bodyPr wrap="none" rtlCol="0">
-            <a:spAutoFit/>
-          </a:bodyPr>
-          <a:lstStyle/>
-          <a:p>
-            <a:pPr algn="ctr"/>
-            <a:r>
-              <a:rPr lang="de-DE" sz="1800" b="1" dirty="0" smtClean="0">
-                <a:solidFill>
-                  <a:srgbClr val="FF0000"/>
-                </a:solidFill>
-              </a:rPr>
-              <a:t>What?</a:t>
-            </a:r>
-          </a:p>
-        </p:txBody>
-      </p:sp>
-      <p:sp>
-        <p:nvSpPr>
-          <p:cNvPr id="17" name="TextBox 16"/>
-          <p:cNvSpPr txBox="1"/>
-          <p:nvPr/>
-        </p:nvSpPr>
-        <p:spPr>
-          <a:xfrm>
-            <a:off x="3484902" y="6075283"/>
-            <a:ext cx="732445" cy="369332"/>
-          </a:xfrm>
-          <a:prstGeom prst="rect">
-            <a:avLst/>
-          </a:prstGeom>
-          <a:noFill/>
-        </p:spPr>
-        <p:txBody>
-          <a:bodyPr wrap="none" rtlCol="0">
-            <a:spAutoFit/>
-          </a:bodyPr>
-          <a:lstStyle/>
-          <a:p>
-            <a:pPr algn="ctr"/>
-            <a:r>
-              <a:rPr lang="de-DE" sz="1800" b="1" dirty="0" smtClean="0">
+            </a:fontRef>
+          </p:style>
+        </p:cxnSp>
+        <p:cxnSp>
+          <p:nvCxnSpPr>
+            <p:cNvPr id="21" name="Straight Arrow Connector 20"/>
+            <p:cNvCxnSpPr/>
+            <p:nvPr/>
+          </p:nvCxnSpPr>
+          <p:spPr>
+            <a:xfrm>
+              <a:off x="4212313" y="6277705"/>
+              <a:ext cx="626566" cy="229093"/>
+            </a:xfrm>
+            <a:prstGeom prst="straightConnector1">
+              <a:avLst/>
+            </a:prstGeom>
+            <a:ln>
+              <a:solidFill>
+                <a:schemeClr val="tx1"/>
+              </a:solidFill>
+              <a:tailEnd type="triangle"/>
+            </a:ln>
+          </p:spPr>
+          <p:style>
+            <a:lnRef idx="1">
+              <a:schemeClr val="accent1"/>
+            </a:lnRef>
+            <a:fillRef idx="0">
+              <a:schemeClr val="accent1"/>
+            </a:fillRef>
+            <a:effectRef idx="0">
+              <a:schemeClr val="accent1"/>
+            </a:effectRef>
+            <a:fontRef idx="minor">
+              <a:schemeClr val="tx1"/>
+            </a:fontRef>
+          </p:style>
+        </p:cxnSp>
+        <p:sp>
+          <p:nvSpPr>
+            <p:cNvPr id="25" name="TextBox 24"/>
+            <p:cNvSpPr txBox="1"/>
+            <p:nvPr/>
+          </p:nvSpPr>
+          <p:spPr>
+            <a:xfrm>
+              <a:off x="4254117" y="5618977"/>
+              <a:ext cx="530915" cy="369332"/>
+            </a:xfrm>
+            <a:prstGeom prst="rect">
+              <a:avLst/>
+            </a:prstGeom>
+            <a:noFill/>
+          </p:spPr>
+          <p:txBody>
+            <a:bodyPr wrap="none" rtlCol="0">
+              <a:spAutoFit/>
+            </a:bodyPr>
+            <a:lstStyle/>
+            <a:p>
+              <a:r>
+                <a:rPr lang="de-DE" sz="1800" dirty="0">
+                  <a:solidFill>
+                    <a:srgbClr val="00B050"/>
+                  </a:solidFill>
+                </a:rPr>
+                <a:t>Pull</a:t>
+              </a:r>
+              <a:endParaRPr lang="en-US" sz="1800" dirty="0">
                 <a:solidFill>
                   <a:srgbClr val="00B050"/>
                 </a:solidFill>
-              </a:rPr>
-              <a:t>How?</a:t>
-            </a:r>
-            <a:endParaRPr lang="en-US" sz="1800" b="1" dirty="0">
+              </a:endParaRPr>
+            </a:p>
+          </p:txBody>
+        </p:sp>
+        <p:sp>
+          <p:nvSpPr>
+            <p:cNvPr id="26" name="TextBox 25"/>
+            <p:cNvSpPr txBox="1"/>
+            <p:nvPr/>
+          </p:nvSpPr>
+          <p:spPr>
+            <a:xfrm>
+              <a:off x="4220453" y="6411206"/>
+              <a:ext cx="606384" cy="369332"/>
+            </a:xfrm>
+            <a:prstGeom prst="rect">
+              <a:avLst/>
+            </a:prstGeom>
+            <a:noFill/>
+          </p:spPr>
+          <p:txBody>
+            <a:bodyPr wrap="none" rtlCol="0">
+              <a:spAutoFit/>
+            </a:bodyPr>
+            <a:lstStyle/>
+            <a:p>
+              <a:r>
+                <a:rPr lang="de-DE" sz="1800" dirty="0">
+                  <a:solidFill>
+                    <a:srgbClr val="00B050"/>
+                  </a:solidFill>
+                </a:rPr>
+                <a:t>Turn</a:t>
+              </a:r>
+              <a:endParaRPr lang="en-US" sz="1800" dirty="0">
+                <a:solidFill>
+                  <a:srgbClr val="00B050"/>
+                </a:solidFill>
+              </a:endParaRPr>
+            </a:p>
+          </p:txBody>
+        </p:sp>
+        <p:cxnSp>
+          <p:nvCxnSpPr>
+            <p:cNvPr id="27" name="Straight Arrow Connector 26"/>
+            <p:cNvCxnSpPr/>
+            <p:nvPr/>
+          </p:nvCxnSpPr>
+          <p:spPr>
+            <a:xfrm>
+              <a:off x="3152569" y="6372450"/>
+              <a:ext cx="0" cy="219347"/>
+            </a:xfrm>
+            <a:prstGeom prst="straightConnector1">
+              <a:avLst/>
+            </a:prstGeom>
+            <a:ln>
               <a:solidFill>
-                <a:srgbClr val="00B050"/>
+                <a:schemeClr val="tx1"/>
               </a:solidFill>
-            </a:endParaRPr>
-          </a:p>
-        </p:txBody>
-      </p:sp>
-      <p:sp>
-        <p:nvSpPr>
-          <p:cNvPr id="18" name="Rectangle 17"/>
-          <p:cNvSpPr/>
-          <p:nvPr/>
-        </p:nvSpPr>
-        <p:spPr>
-          <a:xfrm>
-            <a:off x="2804557" y="6481109"/>
-            <a:ext cx="696024" cy="369332"/>
-          </a:xfrm>
-          <a:prstGeom prst="rect">
-            <a:avLst/>
-          </a:prstGeom>
-        </p:spPr>
-        <p:txBody>
-          <a:bodyPr wrap="none">
-            <a:spAutoFit/>
-          </a:bodyPr>
-          <a:lstStyle/>
-          <a:p>
-            <a:r>
-              <a:rPr lang="de-DE" sz="1800" dirty="0">
-                <a:solidFill>
-                  <a:srgbClr val="FF0000"/>
-                </a:solidFill>
-              </a:rPr>
-              <a:t>Open</a:t>
-            </a:r>
-            <a:endParaRPr lang="en-US" sz="1800" dirty="0">
-              <a:solidFill>
-                <a:srgbClr val="FF0000"/>
-              </a:solidFill>
-            </a:endParaRPr>
-          </a:p>
-        </p:txBody>
-      </p:sp>
-      <p:cxnSp>
-        <p:nvCxnSpPr>
-          <p:cNvPr id="20" name="Straight Arrow Connector 19"/>
-          <p:cNvCxnSpPr/>
-          <p:nvPr/>
-        </p:nvCxnSpPr>
-        <p:spPr>
-          <a:xfrm flipV="1">
-            <a:off x="4212313" y="5895965"/>
-            <a:ext cx="614524" cy="323591"/>
-          </a:xfrm>
-          <a:prstGeom prst="straightConnector1">
-            <a:avLst/>
-          </a:prstGeom>
-          <a:ln>
-            <a:solidFill>
+              <a:tailEnd type="triangle"/>
+            </a:ln>
+          </p:spPr>
+          <p:style>
+            <a:lnRef idx="1">
+              <a:schemeClr val="accent1"/>
+            </a:lnRef>
+            <a:fillRef idx="0">
+              <a:schemeClr val="accent1"/>
+            </a:fillRef>
+            <a:effectRef idx="0">
+              <a:schemeClr val="accent1"/>
+            </a:effectRef>
+            <a:fontRef idx="minor">
               <a:schemeClr val="tx1"/>
-            </a:solidFill>
-            <a:tailEnd type="triangle"/>
-          </a:ln>
-        </p:spPr>
-        <p:style>
-          <a:lnRef idx="1">
-            <a:schemeClr val="accent1"/>
-          </a:lnRef>
-          <a:fillRef idx="0">
-            <a:schemeClr val="accent1"/>
-          </a:fillRef>
-          <a:effectRef idx="0">
-            <a:schemeClr val="accent1"/>
-          </a:effectRef>
-          <a:fontRef idx="minor">
-            <a:schemeClr val="tx1"/>
-          </a:fontRef>
-        </p:style>
-      </p:cxnSp>
-      <p:cxnSp>
-        <p:nvCxnSpPr>
-          <p:cNvPr id="21" name="Straight Arrow Connector 20"/>
-          <p:cNvCxnSpPr/>
-          <p:nvPr/>
-        </p:nvCxnSpPr>
-        <p:spPr>
-          <a:xfrm>
-            <a:off x="4212313" y="6277705"/>
-            <a:ext cx="626566" cy="229093"/>
-          </a:xfrm>
-          <a:prstGeom prst="straightConnector1">
-            <a:avLst/>
-          </a:prstGeom>
-          <a:ln>
-            <a:solidFill>
-              <a:schemeClr val="tx1"/>
-            </a:solidFill>
-            <a:tailEnd type="triangle"/>
-          </a:ln>
-        </p:spPr>
-        <p:style>
-          <a:lnRef idx="1">
-            <a:schemeClr val="accent1"/>
-          </a:lnRef>
-          <a:fillRef idx="0">
-            <a:schemeClr val="accent1"/>
-          </a:fillRef>
-          <a:effectRef idx="0">
-            <a:schemeClr val="accent1"/>
-          </a:effectRef>
-          <a:fontRef idx="minor">
-            <a:schemeClr val="tx1"/>
-          </a:fontRef>
-        </p:style>
-      </p:cxnSp>
-      <p:sp>
-        <p:nvSpPr>
-          <p:cNvPr id="25" name="TextBox 24"/>
-          <p:cNvSpPr txBox="1"/>
-          <p:nvPr/>
-        </p:nvSpPr>
-        <p:spPr>
-          <a:xfrm>
-            <a:off x="4254117" y="5618977"/>
-            <a:ext cx="530915" cy="369332"/>
-          </a:xfrm>
-          <a:prstGeom prst="rect">
-            <a:avLst/>
-          </a:prstGeom>
-          <a:noFill/>
-        </p:spPr>
-        <p:txBody>
-          <a:bodyPr wrap="none" rtlCol="0">
-            <a:spAutoFit/>
-          </a:bodyPr>
-          <a:lstStyle/>
-          <a:p>
-            <a:r>
-              <a:rPr lang="de-DE" sz="1800" dirty="0" smtClean="0">
-                <a:solidFill>
-                  <a:srgbClr val="00B050"/>
-                </a:solidFill>
-              </a:rPr>
-              <a:t>Pull</a:t>
-            </a:r>
-            <a:endParaRPr lang="en-US" sz="1800" dirty="0">
-              <a:solidFill>
-                <a:srgbClr val="00B050"/>
-              </a:solidFill>
-            </a:endParaRPr>
-          </a:p>
-        </p:txBody>
-      </p:sp>
-      <p:sp>
-        <p:nvSpPr>
-          <p:cNvPr id="26" name="TextBox 25"/>
-          <p:cNvSpPr txBox="1"/>
-          <p:nvPr/>
-        </p:nvSpPr>
-        <p:spPr>
-          <a:xfrm>
-            <a:off x="4220453" y="6411206"/>
-            <a:ext cx="606384" cy="369332"/>
-          </a:xfrm>
-          <a:prstGeom prst="rect">
-            <a:avLst/>
-          </a:prstGeom>
-          <a:noFill/>
-        </p:spPr>
-        <p:txBody>
-          <a:bodyPr wrap="none" rtlCol="0">
-            <a:spAutoFit/>
-          </a:bodyPr>
-          <a:lstStyle/>
-          <a:p>
-            <a:r>
-              <a:rPr lang="de-DE" sz="1800" dirty="0" smtClean="0">
-                <a:solidFill>
-                  <a:srgbClr val="00B050"/>
-                </a:solidFill>
-              </a:rPr>
-              <a:t>Turn</a:t>
-            </a:r>
-            <a:endParaRPr lang="en-US" sz="1800" dirty="0">
-              <a:solidFill>
-                <a:srgbClr val="00B050"/>
-              </a:solidFill>
-            </a:endParaRPr>
-          </a:p>
-        </p:txBody>
-      </p:sp>
-      <p:cxnSp>
-        <p:nvCxnSpPr>
-          <p:cNvPr id="27" name="Straight Arrow Connector 26"/>
-          <p:cNvCxnSpPr/>
-          <p:nvPr/>
-        </p:nvCxnSpPr>
-        <p:spPr>
-          <a:xfrm>
-            <a:off x="3152569" y="6372450"/>
-            <a:ext cx="0" cy="219347"/>
-          </a:xfrm>
-          <a:prstGeom prst="straightConnector1">
-            <a:avLst/>
-          </a:prstGeom>
-          <a:ln>
-            <a:solidFill>
-              <a:schemeClr val="tx1"/>
-            </a:solidFill>
-            <a:tailEnd type="triangle"/>
-          </a:ln>
-        </p:spPr>
-        <p:style>
-          <a:lnRef idx="1">
-            <a:schemeClr val="accent1"/>
-          </a:lnRef>
-          <a:fillRef idx="0">
-            <a:schemeClr val="accent1"/>
-          </a:fillRef>
-          <a:effectRef idx="0">
-            <a:schemeClr val="accent1"/>
-          </a:effectRef>
-          <a:fontRef idx="minor">
-            <a:schemeClr val="tx1"/>
-          </a:fontRef>
-        </p:style>
-      </p:cxnSp>
+            </a:fontRef>
+          </p:style>
+        </p:cxnSp>
+      </p:grpSp>
       <p:sp>
         <p:nvSpPr>
           <p:cNvPr id="3" name="Content Placeholder 2"/>
@@ -13179,7 +13008,7 @@
         </p:nvSpPr>
         <p:spPr>
           <a:xfrm>
-            <a:off x="609917" y="1600201"/>
+            <a:off x="556964" y="1062032"/>
             <a:ext cx="5489258" cy="4525963"/>
           </a:xfrm>
         </p:spPr>
@@ -13188,75 +13017,67 @@
           <a:lstStyle/>
           <a:p>
             <a:r>
-              <a:rPr lang="de-DE" b="1" dirty="0" smtClean="0"/>
+              <a:rPr lang="de-DE" b="1" dirty="0"/>
               <a:t>WoT Architecture</a:t>
             </a:r>
           </a:p>
           <a:p>
             <a:pPr lvl="1"/>
             <a:r>
-              <a:rPr lang="de-DE" dirty="0" smtClean="0"/>
+              <a:rPr lang="de-DE" dirty="0"/>
               <a:t>Constraints</a:t>
             </a:r>
           </a:p>
           <a:p>
             <a:pPr lvl="2"/>
             <a:r>
-              <a:rPr lang="de-DE" dirty="0" smtClean="0"/>
+              <a:rPr lang="de-DE" dirty="0"/>
               <a:t>Things must have TD (W3C WoT)</a:t>
             </a:r>
           </a:p>
           <a:p>
             <a:pPr lvl="2"/>
             <a:r>
-              <a:rPr lang="de-DE" dirty="0" smtClean="0"/>
+              <a:rPr lang="de-DE" dirty="0"/>
               <a:t>Must use hypermedia controls (general WoT)</a:t>
             </a:r>
           </a:p>
           <a:p>
             <a:pPr lvl="3"/>
             <a:r>
-              <a:rPr lang="de-DE" dirty="0" smtClean="0"/>
+              <a:rPr lang="de-DE" dirty="0"/>
               <a:t>URIs</a:t>
             </a:r>
           </a:p>
           <a:p>
             <a:pPr lvl="3"/>
             <a:r>
-              <a:rPr lang="de-DE" dirty="0" smtClean="0"/>
+              <a:rPr lang="de-DE" dirty="0"/>
               <a:t>Standard set of methods</a:t>
             </a:r>
           </a:p>
           <a:p>
             <a:pPr lvl="3"/>
             <a:r>
-              <a:rPr lang="de-DE" dirty="0" smtClean="0"/>
+              <a:rPr lang="de-DE" dirty="0"/>
               <a:t>Media Types</a:t>
             </a:r>
           </a:p>
           <a:p>
             <a:pPr lvl="1"/>
             <a:r>
-              <a:rPr lang="de-DE" dirty="0" smtClean="0"/>
+              <a:rPr lang="de-DE" dirty="0"/>
               <a:t>Interaction Affordances</a:t>
             </a:r>
           </a:p>
           <a:p>
             <a:pPr lvl="2"/>
             <a:r>
-              <a:rPr lang="en-US" dirty="0" smtClean="0"/>
-              <a:t>Metadata </a:t>
-            </a:r>
-            <a:r>
               <a:rPr lang="en-US" dirty="0"/>
-              <a:t>of a Thing that shows and describes </a:t>
-            </a:r>
-            <a:r>
-              <a:rPr lang="en-US" dirty="0" smtClean="0"/>
-              <a:t>the possible choices (</a:t>
-            </a:r>
-            <a:r>
-              <a:rPr lang="en-US" dirty="0" smtClean="0">
+              <a:t>Metadata of a Thing that shows and describes the possible choices (</a:t>
+            </a:r>
+            <a:r>
+              <a:rPr lang="en-US" dirty="0">
                 <a:solidFill>
                   <a:srgbClr val="FF0000"/>
                 </a:solidFill>
@@ -13264,12 +13085,8 @@
               <a:t>what</a:t>
             </a:r>
             <a:r>
-              <a:rPr lang="en-US" dirty="0" smtClean="0"/>
-              <a:t>) to Consumers, </a:t>
-            </a:r>
-            <a:r>
               <a:rPr lang="en-US" dirty="0"/>
-              <a:t>thereby suggesting </a:t>
+              <a:t>) to Consumers, thereby suggesting </a:t>
             </a:r>
             <a:r>
               <a:rPr lang="en-US" dirty="0">
@@ -13296,13 +13113,6 @@
   <p:clrMapOvr>
     <a:masterClrMapping/>
   </p:clrMapOvr>
-  <p:timing>
-    <p:tnLst>
-      <p:par>
-        <p:cTn id="1" dur="indefinite" restart="never" nodeType="tmRoot"/>
-      </p:par>
-    </p:tnLst>
-  </p:timing>
 </p:sld>
 </file>
 
@@ -13339,7 +13149,7 @@
           <a:lstStyle/>
           <a:p>
             <a:r>
-              <a:rPr lang="de-DE" dirty="0" smtClean="0"/>
+              <a:rPr lang="de-DE" dirty="0"/>
               <a:t>Published WG Notes</a:t>
             </a:r>
             <a:endParaRPr lang="en-US" dirty="0"/>
@@ -13362,37 +13172,44 @@
           <a:lstStyle/>
           <a:p>
             <a:r>
-              <a:rPr lang="de-DE" b="1" dirty="0" smtClean="0"/>
+              <a:rPr lang="de-DE" b="1" dirty="0"/>
               <a:t>WoT Security and Privacy Guidelines</a:t>
             </a:r>
           </a:p>
           <a:p>
             <a:pPr lvl="1"/>
             <a:r>
-              <a:rPr lang="de-DE" dirty="0" smtClean="0"/>
+              <a:rPr lang="de-DE" dirty="0"/>
               <a:t>Details beyond the security considerations in each specification for a holistic security and privacy configuration of Things</a:t>
             </a:r>
           </a:p>
           <a:p>
+            <a:pPr lvl="1"/>
+            <a:r>
+              <a:rPr lang="de-DE" dirty="0"/>
+              <a:t>Security testing plan</a:t>
+            </a:r>
+          </a:p>
+          <a:p>
             <a:endParaRPr lang="de-DE" dirty="0"/>
           </a:p>
           <a:p>
             <a:r>
-              <a:rPr lang="de-DE" b="1" dirty="0" smtClean="0"/>
+              <a:rPr lang="de-DE" b="1" dirty="0"/>
               <a:t>WoT Binding Templates</a:t>
             </a:r>
-            <a:endParaRPr lang="en-US" b="1" dirty="0" smtClean="0"/>
+            <a:endParaRPr lang="en-US" b="1" dirty="0"/>
           </a:p>
           <a:p>
             <a:pPr lvl="1"/>
             <a:r>
-              <a:rPr lang="de-DE" dirty="0" smtClean="0"/>
+              <a:rPr lang="de-DE" dirty="0"/>
               <a:t>Documetation for how to describe existing IoT ecosystems (e.g., OCF or generic Web) with WoT Thing Description</a:t>
             </a:r>
           </a:p>
           <a:p>
             <a:pPr lvl="1"/>
-            <a:endParaRPr lang="de-DE" dirty="0" smtClean="0"/>
+            <a:endParaRPr lang="de-DE" dirty="0"/>
           </a:p>
         </p:txBody>
       </p:sp>
@@ -13412,41 +13229,40 @@
           <a:lstStyle/>
           <a:p>
             <a:r>
-              <a:rPr lang="de-DE" b="1" dirty="0" smtClean="0"/>
+              <a:rPr lang="de-DE" b="1" dirty="0"/>
               <a:t>WoT Scripting API</a:t>
             </a:r>
           </a:p>
           <a:p>
             <a:pPr lvl="1"/>
             <a:r>
-              <a:rPr lang="de-DE" dirty="0" smtClean="0"/>
+              <a:rPr lang="de-DE" dirty="0"/>
               <a:t>Proposal for a standard API to consume and produce WoT Thing Descriptions</a:t>
             </a:r>
           </a:p>
           <a:p>
             <a:pPr lvl="1"/>
             <a:r>
-              <a:rPr lang="de-DE" dirty="0" smtClean="0"/>
+              <a:rPr lang="de-DE" dirty="0"/>
               <a:t>Provides interface between applications and network-facing API of IoT devices</a:t>
             </a:r>
             <a:br>
-              <a:rPr lang="de-DE" dirty="0" smtClean="0"/>
+              <a:rPr lang="de-DE" dirty="0"/>
             </a:br>
             <a:r>
-              <a:rPr lang="de-DE" dirty="0" smtClean="0"/>
+              <a:rPr lang="de-DE" dirty="0"/>
               <a:t>(cf. Web browser APIs)</a:t>
             </a:r>
+          </a:p>
+          <a:p>
+            <a:pPr lvl="1"/>
             <a:endParaRPr lang="de-DE" dirty="0"/>
           </a:p>
           <a:p>
             <a:pPr lvl="1"/>
-            <a:endParaRPr lang="de-DE" dirty="0" smtClean="0"/>
-          </a:p>
-          <a:p>
-            <a:pPr lvl="1"/>
-            <a:r>
-              <a:rPr lang="de-DE" dirty="0" smtClean="0"/>
-              <a:t>Documents learnings of the design process</a:t>
+            <a:r>
+              <a:rPr lang="de-DE" dirty="0"/>
+              <a:t>Documents learnings from the design process</a:t>
             </a:r>
             <a:endParaRPr lang="en-US" dirty="0"/>
           </a:p>
@@ -13462,13 +13278,6 @@
   <p:clrMapOvr>
     <a:masterClrMapping/>
   </p:clrMapOvr>
-  <p:timing>
-    <p:tnLst>
-      <p:par>
-        <p:cTn id="1" dur="indefinite" restart="never" nodeType="tmRoot"/>
-      </p:par>
-    </p:tnLst>
-  </p:timing>
 </p:sld>
 </file>
 
@@ -13549,31 +13358,14 @@
             <a:pPr lvl="1"/>
             <a:r>
               <a:rPr lang="en-US" dirty="0"/>
-              <a:t>Object </a:t>
-            </a:r>
+              <a:t>Object notation (name: value) instead of arrays</a:t>
+            </a:r>
+          </a:p>
+          <a:p>
+            <a:pPr lvl="1"/>
             <a:r>
               <a:rPr lang="en-US" dirty="0"/>
-              <a:t>notation (</a:t>
-            </a:r>
-            <a:r>
-              <a:rPr lang="en-US" dirty="0" smtClean="0"/>
-              <a:t>name: value) instead of arrays</a:t>
-            </a:r>
-            <a:endParaRPr lang="en-US" dirty="0"/>
-          </a:p>
-          <a:p>
-            <a:pPr lvl="1"/>
-            <a:r>
-              <a:rPr lang="en-US" dirty="0"/>
-              <a:t>More similarity to </a:t>
-            </a:r>
-            <a:r>
-              <a:rPr lang="en-US" dirty="0" smtClean="0"/>
-              <a:t>common JSON </a:t>
-            </a:r>
-            <a:r>
-              <a:rPr lang="en-US" dirty="0"/>
-              <a:t>practices</a:t>
+              <a:t>More similarity to common JSON practices</a:t>
             </a:r>
           </a:p>
           <a:p>
@@ -13586,29 +13378,16 @@
             <a:pPr lvl="1"/>
             <a:r>
               <a:rPr lang="en-US" dirty="0"/>
-              <a:t>Focus on </a:t>
-            </a:r>
-            <a:r>
-              <a:rPr lang="en-US" dirty="0" smtClean="0"/>
-              <a:t>HTTPS </a:t>
-            </a:r>
-            <a:r>
-              <a:rPr lang="en-US" dirty="0" smtClean="0"/>
-              <a:t>(Basic </a:t>
-            </a:r>
-            <a:r>
-              <a:rPr lang="en-US" dirty="0" err="1" smtClean="0"/>
+              <a:t>Focus on HTTPS (Basic </a:t>
+            </a:r>
+            <a:r>
+              <a:rPr lang="en-US" dirty="0" err="1"/>
               <a:t>Auth</a:t>
             </a:r>
             <a:r>
               <a:rPr lang="en-US" dirty="0"/>
-              <a:t>,</a:t>
-            </a:r>
-            <a:r>
-              <a:rPr lang="en-US" dirty="0" smtClean="0"/>
-              <a:t> Digest, Tokens, OAuth2)</a:t>
-            </a:r>
-            <a:endParaRPr lang="en-US" dirty="0"/>
+              <a:t>, Digest, Tokens, OAuth2)</a:t>
+            </a:r>
           </a:p>
           <a:p>
             <a:r>
@@ -13620,69 +13399,41 @@
             <a:pPr lvl="1"/>
             <a:r>
               <a:rPr lang="en-US" dirty="0"/>
-              <a:t>Focus on </a:t>
-            </a:r>
-            <a:r>
-              <a:rPr lang="en-US" dirty="0" smtClean="0"/>
-              <a:t>HTTP and </a:t>
-            </a:r>
+              <a:t>Focus on HTTP and structured payloads compatible with JSON</a:t>
+            </a:r>
+          </a:p>
+          <a:p>
+            <a:pPr lvl="1"/>
             <a:r>
               <a:rPr lang="en-US" dirty="0"/>
-              <a:t>structured payloads compatible with JSON</a:t>
+              <a:t>Support for Events also using </a:t>
+            </a:r>
+            <a:r>
+              <a:rPr lang="en-US" dirty="0" err="1"/>
+              <a:t>subprotocols</a:t>
+            </a:r>
+            <a:r>
+              <a:rPr lang="en-US" dirty="0"/>
+              <a:t> (e.g., long polling in HTTP)</a:t>
+            </a:r>
+          </a:p>
+          <a:p>
+            <a:r>
+              <a:rPr lang="de-DE" dirty="0"/>
+              <a:t>Extension Points</a:t>
             </a:r>
           </a:p>
           <a:p>
             <a:pPr lvl="1"/>
             <a:r>
-              <a:rPr lang="en-US" dirty="0"/>
-              <a:t>Support for </a:t>
-            </a:r>
-            <a:r>
-              <a:rPr lang="en-US" dirty="0" smtClean="0"/>
-              <a:t>Events also using </a:t>
-            </a:r>
-            <a:r>
-              <a:rPr lang="en-US" dirty="0" err="1" smtClean="0"/>
-              <a:t>subprotocols</a:t>
-            </a:r>
-            <a:r>
-              <a:rPr lang="en-US" dirty="0" smtClean="0"/>
-              <a:t> </a:t>
-            </a:r>
-            <a:r>
-              <a:rPr lang="en-US" dirty="0"/>
-              <a:t>(</a:t>
-            </a:r>
-            <a:r>
-              <a:rPr lang="en-US" dirty="0" smtClean="0"/>
-              <a:t>e.g., </a:t>
-            </a:r>
-            <a:r>
-              <a:rPr lang="en-US" dirty="0"/>
-              <a:t>long polling in HTTP</a:t>
-            </a:r>
-            <a:r>
-              <a:rPr lang="en-US" dirty="0" smtClean="0"/>
-              <a:t>)</a:t>
-            </a:r>
-          </a:p>
-          <a:p>
-            <a:r>
-              <a:rPr lang="de-DE" dirty="0" smtClean="0"/>
-              <a:t>Extension Points</a:t>
+              <a:rPr lang="de-DE" dirty="0"/>
+              <a:t>CoAP(S), MQTT(S), and further security schemes (e.g., ACE)</a:t>
             </a:r>
           </a:p>
           <a:p>
             <a:pPr lvl="1"/>
             <a:r>
-              <a:rPr lang="de-DE" dirty="0" smtClean="0"/>
-              <a:t>CoAP(S), MQTT(S), and further security schemes (e.g., ACE)</a:t>
-            </a:r>
-          </a:p>
-          <a:p>
-            <a:pPr lvl="1"/>
-            <a:r>
-              <a:rPr lang="de-DE" dirty="0" smtClean="0"/>
+              <a:rPr lang="de-DE" dirty="0"/>
               <a:t>Semantic annotations with custom vocabularies (JSON-LD @context and @type)</a:t>
             </a:r>
             <a:endParaRPr lang="en-US" b="1" i="1" dirty="0"/>
@@ -13702,13 +13453,6 @@
   <p:clrMapOvr>
     <a:masterClrMapping/>
   </p:clrMapOvr>
-  <p:timing>
-    <p:tnLst>
-      <p:par>
-        <p:cTn id="1" dur="indefinite" restart="never" nodeType="tmRoot"/>
-      </p:par>
-    </p:tnLst>
-  </p:timing>
 </p:sld>
 </file>
 
@@ -13995,13 +13739,6 @@
   <p:clrMapOvr>
     <a:masterClrMapping/>
   </p:clrMapOvr>
-  <p:timing>
-    <p:tnLst>
-      <p:par>
-        <p:cTn id="1" dur="indefinite" restart="never" nodeType="tmRoot"/>
-      </p:par>
-    </p:tnLst>
-  </p:timing>
 </p:sld>
 </file>
 
@@ -14079,10 +13816,6 @@
               </a:rPr>
               <a:t>https://www.w3.org/WoT/IG/wiki</a:t>
             </a:r>
-            <a:r>
-              <a:rPr lang="en-US" sz="2100" dirty="0"/>
-              <a:t/>
-            </a:r>
             <a:br>
               <a:rPr lang="en-US" sz="2100" dirty="0"/>
             </a:br>
@@ -14109,10 +13842,6 @@
               </a:rPr>
               <a:t>https://www.w3.org/2016/07/wot-ig-charter.html</a:t>
             </a:r>
-            <a:r>
-              <a:rPr lang="en-US" sz="2100" dirty="0"/>
-              <a:t/>
-            </a:r>
             <a:br>
               <a:rPr lang="en-US" sz="2100" dirty="0"/>
             </a:br>
@@ -14132,10 +13861,6 @@
               </a:rPr>
               <a:t>https://lists.w3.org/Archives/Public/public-wot-ig/</a:t>
             </a:r>
-            <a:r>
-              <a:rPr lang="en-US" sz="2100" dirty="0"/>
-              <a:t/>
-            </a:r>
             <a:br>
               <a:rPr lang="en-US" sz="2100" dirty="0"/>
             </a:br>
@@ -14152,10 +13877,6 @@
               </a:rPr>
               <a:t>https://github.com/w3c/wot</a:t>
             </a:r>
-            <a:r>
-              <a:rPr lang="en-US" sz="2100" dirty="0"/>
-              <a:t/>
-            </a:r>
             <a:br>
               <a:rPr lang="en-US" sz="2100" dirty="0"/>
             </a:br>
@@ -14182,10 +13903,6 @@
               </a:rPr>
               <a:t>https://www.w3.org/2016/12/wot-wg-2016.html</a:t>
             </a:r>
-            <a:r>
-              <a:rPr lang="en-US" sz="2100" dirty="0"/>
-              <a:t/>
-            </a:r>
             <a:br>
               <a:rPr lang="en-US" sz="2100" dirty="0"/>
             </a:br>
@@ -14201,10 +13918,6 @@
                 <a:hlinkClick r:id="rId8"/>
               </a:rPr>
               <a:t>https://www.w3.org/WoT/WG/</a:t>
-            </a:r>
-            <a:r>
-              <a:rPr lang="en-US" sz="2100" dirty="0"/>
-              <a:t/>
             </a:r>
             <a:br>
               <a:rPr lang="en-US" sz="2100" dirty="0"/>
@@ -14420,13 +14133,6 @@
   <p:clrMapOvr>
     <a:masterClrMapping/>
   </p:clrMapOvr>
-  <p:timing>
-    <p:tnLst>
-      <p:par>
-        <p:cTn id="1" dur="indefinite" restart="never" nodeType="tmRoot"/>
-      </p:par>
-    </p:tnLst>
-  </p:timing>
 </p:sld>
 </file>
 
@@ -16315,33 +16021,33 @@
 
 <file path=customXml/item1.xml><?xml version="1.0" encoding="utf-8"?>
 <p4ppTags>
-  <Name>One object (large) + Navigation</Name>
+  <Name>Text + Index</Name>
   <PpLayout>32</PpLayout>
-  <Index>17</Index>
+  <Index>8</Index>
 </p4ppTags>
 </file>
 
 <file path=customXml/item10.xml><?xml version="1.0" encoding="utf-8"?>
 <p4ppTags>
-  <Name>Free Content</Name>
-  <PpLayout>11</PpLayout>
-  <Index>9</Index>
+  <Name>Two columns + Navigation</Name>
+  <PpLayout>32</PpLayout>
+  <Index>19</Index>
 </p4ppTags>
 </file>
 
 <file path=customXml/item11.xml><?xml version="1.0" encoding="utf-8"?>
 <p4ppTags>
-  <Name>Four objects</Name>
-  <PpLayout>24</PpLayout>
-  <Index>15</Index>
+  <Name>Three columns</Name>
+  <PpLayout>32</PpLayout>
+  <Index>14</Index>
 </p4ppTags>
 </file>
 
 <file path=customXml/item12.xml><?xml version="1.0" encoding="utf-8"?>
 <p4ppTags>
-  <Name>One object (small)</Name>
-  <PpLayout>16</PpLayout>
-  <Index>11</Index>
+  <Name>One object (small) + Navigation</Name>
+  <PpLayout>32</PpLayout>
+  <Index>18</Index>
 </p4ppTags>
 </file>
 
@@ -16355,33 +16061,33 @@
 
 <file path=customXml/item2.xml><?xml version="1.0" encoding="utf-8"?>
 <p4ppTags>
+  <Name>Two rows</Name>
+  <PpLayout>32</PpLayout>
+  <Index>13</Index>
+</p4ppTags>
+</file>
+
+<file path=customXml/item3.xml><?xml version="1.0" encoding="utf-8"?>
+<p4ppTags>
+  <Name>One object (small)</Name>
+  <PpLayout>16</PpLayout>
+  <Index>11</Index>
+</p4ppTags>
+</file>
+
+<file path=customXml/item4.xml><?xml version="1.0" encoding="utf-8"?>
+<p4ppTags>
   <Name>Free Content + Navigation</Name>
   <PpLayout>32</PpLayout>
   <Index>16</Index>
 </p4ppTags>
 </file>
 
-<file path=customXml/item3.xml><?xml version="1.0" encoding="utf-8"?>
-<p4ppTags>
-  <Name>Text + Index</Name>
-  <PpLayout>32</PpLayout>
-  <Index>8</Index>
-</p4ppTags>
-</file>
-
-<file path=customXml/item4.xml><?xml version="1.0" encoding="utf-8"?>
-<p4ppTags>
-  <Name>Two columns + Navigation</Name>
-  <PpLayout>32</PpLayout>
-  <Index>19</Index>
-</p4ppTags>
-</file>
-
 <file path=customXml/item5.xml><?xml version="1.0" encoding="utf-8"?>
 <p4ppTags>
-  <Name>One object (large)</Name>
-  <PpLayout>16</PpLayout>
-  <Index>10</Index>
+  <Name>One object (large) + Navigation</Name>
+  <PpLayout>32</PpLayout>
+  <Index>17</Index>
 </p4ppTags>
 </file>
 
@@ -16395,48 +16101,48 @@
 
 <file path=customXml/item7.xml><?xml version="1.0" encoding="utf-8"?>
 <p4ppTags>
-  <Name>Two rows</Name>
-  <PpLayout>32</PpLayout>
-  <Index>13</Index>
+  <Name>Four objects</Name>
+  <PpLayout>24</PpLayout>
+  <Index>15</Index>
 </p4ppTags>
 </file>
 
 <file path=customXml/item8.xml><?xml version="1.0" encoding="utf-8"?>
 <p4ppTags>
-  <Name>One object (small) + Navigation</Name>
-  <PpLayout>32</PpLayout>
-  <Index>18</Index>
+  <Name>One object (large)</Name>
+  <PpLayout>16</PpLayout>
+  <Index>10</Index>
 </p4ppTags>
 </file>
 
 <file path=customXml/item9.xml><?xml version="1.0" encoding="utf-8"?>
 <p4ppTags>
-  <Name>Three columns</Name>
-  <PpLayout>32</PpLayout>
-  <Index>14</Index>
+  <Name>Free Content</Name>
+  <PpLayout>11</PpLayout>
+  <Index>9</Index>
 </p4ppTags>
 </file>
 
 <file path=customXml/itemProps1.xml><?xml version="1.0" encoding="utf-8"?>
-<ds:datastoreItem xmlns:ds="http://schemas.openxmlformats.org/officeDocument/2006/customXml" ds:itemID="{F718F79D-2091-4AD7-864E-B9B95B323394}">
+<ds:datastoreItem xmlns:ds="http://schemas.openxmlformats.org/officeDocument/2006/customXml" ds:itemID="{0D9599B2-641B-429C-8C85-C591ECF8C990}">
   <ds:schemaRefs/>
 </ds:datastoreItem>
 </file>
 
 <file path=customXml/itemProps10.xml><?xml version="1.0" encoding="utf-8"?>
-<ds:datastoreItem xmlns:ds="http://schemas.openxmlformats.org/officeDocument/2006/customXml" ds:itemID="{B5096DD8-53C8-4E83-8664-FC4F8BE8B725}">
+<ds:datastoreItem xmlns:ds="http://schemas.openxmlformats.org/officeDocument/2006/customXml" ds:itemID="{A27DC4FC-F9FA-4AC8-AAAA-729E607CE7E5}">
   <ds:schemaRefs/>
 </ds:datastoreItem>
 </file>
 
 <file path=customXml/itemProps11.xml><?xml version="1.0" encoding="utf-8"?>
-<ds:datastoreItem xmlns:ds="http://schemas.openxmlformats.org/officeDocument/2006/customXml" ds:itemID="{4E8C063E-54DF-40B8-B6B7-24C91B170904}">
+<ds:datastoreItem xmlns:ds="http://schemas.openxmlformats.org/officeDocument/2006/customXml" ds:itemID="{8699A006-2152-4093-B4FC-C6BF20D5E592}">
   <ds:schemaRefs/>
 </ds:datastoreItem>
 </file>
 
 <file path=customXml/itemProps12.xml><?xml version="1.0" encoding="utf-8"?>
-<ds:datastoreItem xmlns:ds="http://schemas.openxmlformats.org/officeDocument/2006/customXml" ds:itemID="{B19D05D1-AE0E-4B0D-AA6A-E4DC4507B75E}">
+<ds:datastoreItem xmlns:ds="http://schemas.openxmlformats.org/officeDocument/2006/customXml" ds:itemID="{0091252C-F36F-40C9-984C-22582B3E6FB3}">
   <ds:schemaRefs/>
 </ds:datastoreItem>
 </file>
@@ -16448,25 +16154,25 @@
 </file>
 
 <file path=customXml/itemProps2.xml><?xml version="1.0" encoding="utf-8"?>
+<ds:datastoreItem xmlns:ds="http://schemas.openxmlformats.org/officeDocument/2006/customXml" ds:itemID="{F14BB4E7-BF22-46E2-AA3C-1ABA12A0B021}">
+  <ds:schemaRefs/>
+</ds:datastoreItem>
+</file>
+
+<file path=customXml/itemProps3.xml><?xml version="1.0" encoding="utf-8"?>
+<ds:datastoreItem xmlns:ds="http://schemas.openxmlformats.org/officeDocument/2006/customXml" ds:itemID="{B19D05D1-AE0E-4B0D-AA6A-E4DC4507B75E}">
+  <ds:schemaRefs/>
+</ds:datastoreItem>
+</file>
+
+<file path=customXml/itemProps4.xml><?xml version="1.0" encoding="utf-8"?>
 <ds:datastoreItem xmlns:ds="http://schemas.openxmlformats.org/officeDocument/2006/customXml" ds:itemID="{3C206999-0CDF-47B3-B85E-D5652B9D7810}">
   <ds:schemaRefs/>
 </ds:datastoreItem>
 </file>
 
-<file path=customXml/itemProps3.xml><?xml version="1.0" encoding="utf-8"?>
-<ds:datastoreItem xmlns:ds="http://schemas.openxmlformats.org/officeDocument/2006/customXml" ds:itemID="{0D9599B2-641B-429C-8C85-C591ECF8C990}">
-  <ds:schemaRefs/>
-</ds:datastoreItem>
-</file>
-
-<file path=customXml/itemProps4.xml><?xml version="1.0" encoding="utf-8"?>
-<ds:datastoreItem xmlns:ds="http://schemas.openxmlformats.org/officeDocument/2006/customXml" ds:itemID="{A27DC4FC-F9FA-4AC8-AAAA-729E607CE7E5}">
-  <ds:schemaRefs/>
-</ds:datastoreItem>
-</file>
-
 <file path=customXml/itemProps5.xml><?xml version="1.0" encoding="utf-8"?>
-<ds:datastoreItem xmlns:ds="http://schemas.openxmlformats.org/officeDocument/2006/customXml" ds:itemID="{864B6C15-1FF1-4ADA-8DBE-CD1DAF35B070}">
+<ds:datastoreItem xmlns:ds="http://schemas.openxmlformats.org/officeDocument/2006/customXml" ds:itemID="{F718F79D-2091-4AD7-864E-B9B95B323394}">
   <ds:schemaRefs/>
 </ds:datastoreItem>
 </file>
@@ -16478,19 +16184,19 @@
 </file>
 
 <file path=customXml/itemProps7.xml><?xml version="1.0" encoding="utf-8"?>
-<ds:datastoreItem xmlns:ds="http://schemas.openxmlformats.org/officeDocument/2006/customXml" ds:itemID="{F14BB4E7-BF22-46E2-AA3C-1ABA12A0B021}">
+<ds:datastoreItem xmlns:ds="http://schemas.openxmlformats.org/officeDocument/2006/customXml" ds:itemID="{4E8C063E-54DF-40B8-B6B7-24C91B170904}">
   <ds:schemaRefs/>
 </ds:datastoreItem>
 </file>
 
 <file path=customXml/itemProps8.xml><?xml version="1.0" encoding="utf-8"?>
-<ds:datastoreItem xmlns:ds="http://schemas.openxmlformats.org/officeDocument/2006/customXml" ds:itemID="{0091252C-F36F-40C9-984C-22582B3E6FB3}">
+<ds:datastoreItem xmlns:ds="http://schemas.openxmlformats.org/officeDocument/2006/customXml" ds:itemID="{864B6C15-1FF1-4ADA-8DBE-CD1DAF35B070}">
   <ds:schemaRefs/>
 </ds:datastoreItem>
 </file>
 
 <file path=customXml/itemProps9.xml><?xml version="1.0" encoding="utf-8"?>
-<ds:datastoreItem xmlns:ds="http://schemas.openxmlformats.org/officeDocument/2006/customXml" ds:itemID="{8699A006-2152-4093-B4FC-C6BF20D5E592}">
+<ds:datastoreItem xmlns:ds="http://schemas.openxmlformats.org/officeDocument/2006/customXml" ds:itemID="{B5096DD8-53C8-4E83-8664-FC4F8BE8B725}">
   <ds:schemaRefs/>
 </ds:datastoreItem>
 </file>
</xml_diff>